<commit_message>
Finished the draft for step 2.
</commit_message>
<xml_diff>
--- a/documentation/_static/sampleTargets.pptx
+++ b/documentation/_static/sampleTargets.pptx
@@ -104,6 +104,11 @@
       </a:defRPr>
     </a:lvl9pPr>
   </p:defaultTextStyle>
+  <p:extLst>
+    <p:ext uri="{EFAFB233-063F-42B5-8137-9DF3F51BA10A}">
+      <p15:sldGuideLst xmlns:p15="http://schemas.microsoft.com/office/powerpoint/2012/main"/>
+    </p:ext>
+  </p:extLst>
 </p:presentation>
 </file>
 
@@ -254,7 +259,7 @@
           <a:p>
             <a:fld id="{8C5C7583-DABD-934D-88EC-D797CA1C67D6}" type="datetimeFigureOut">
               <a:rPr lang="en-US" smtClean="0"/>
-              <a:t>3/2/21</a:t>
+              <a:t>3/3/2021</a:t>
             </a:fld>
             <a:endParaRPr lang="en-US"/>
           </a:p>
@@ -452,7 +457,7 @@
           <a:p>
             <a:fld id="{8C5C7583-DABD-934D-88EC-D797CA1C67D6}" type="datetimeFigureOut">
               <a:rPr lang="en-US" smtClean="0"/>
-              <a:t>3/2/21</a:t>
+              <a:t>3/3/2021</a:t>
             </a:fld>
             <a:endParaRPr lang="en-US"/>
           </a:p>
@@ -660,7 +665,7 @@
           <a:p>
             <a:fld id="{8C5C7583-DABD-934D-88EC-D797CA1C67D6}" type="datetimeFigureOut">
               <a:rPr lang="en-US" smtClean="0"/>
-              <a:t>3/2/21</a:t>
+              <a:t>3/3/2021</a:t>
             </a:fld>
             <a:endParaRPr lang="en-US"/>
           </a:p>
@@ -858,7 +863,7 @@
           <a:p>
             <a:fld id="{8C5C7583-DABD-934D-88EC-D797CA1C67D6}" type="datetimeFigureOut">
               <a:rPr lang="en-US" smtClean="0"/>
-              <a:t>3/2/21</a:t>
+              <a:t>3/3/2021</a:t>
             </a:fld>
             <a:endParaRPr lang="en-US"/>
           </a:p>
@@ -1133,7 +1138,7 @@
           <a:p>
             <a:fld id="{8C5C7583-DABD-934D-88EC-D797CA1C67D6}" type="datetimeFigureOut">
               <a:rPr lang="en-US" smtClean="0"/>
-              <a:t>3/2/21</a:t>
+              <a:t>3/3/2021</a:t>
             </a:fld>
             <a:endParaRPr lang="en-US"/>
           </a:p>
@@ -1398,7 +1403,7 @@
           <a:p>
             <a:fld id="{8C5C7583-DABD-934D-88EC-D797CA1C67D6}" type="datetimeFigureOut">
               <a:rPr lang="en-US" smtClean="0"/>
-              <a:t>3/2/21</a:t>
+              <a:t>3/3/2021</a:t>
             </a:fld>
             <a:endParaRPr lang="en-US"/>
           </a:p>
@@ -1810,7 +1815,7 @@
           <a:p>
             <a:fld id="{8C5C7583-DABD-934D-88EC-D797CA1C67D6}" type="datetimeFigureOut">
               <a:rPr lang="en-US" smtClean="0"/>
-              <a:t>3/2/21</a:t>
+              <a:t>3/3/2021</a:t>
             </a:fld>
             <a:endParaRPr lang="en-US"/>
           </a:p>
@@ -1951,7 +1956,7 @@
           <a:p>
             <a:fld id="{8C5C7583-DABD-934D-88EC-D797CA1C67D6}" type="datetimeFigureOut">
               <a:rPr lang="en-US" smtClean="0"/>
-              <a:t>3/2/21</a:t>
+              <a:t>3/3/2021</a:t>
             </a:fld>
             <a:endParaRPr lang="en-US"/>
           </a:p>
@@ -2064,7 +2069,7 @@
           <a:p>
             <a:fld id="{8C5C7583-DABD-934D-88EC-D797CA1C67D6}" type="datetimeFigureOut">
               <a:rPr lang="en-US" smtClean="0"/>
-              <a:t>3/2/21</a:t>
+              <a:t>3/3/2021</a:t>
             </a:fld>
             <a:endParaRPr lang="en-US"/>
           </a:p>
@@ -2375,7 +2380,7 @@
           <a:p>
             <a:fld id="{8C5C7583-DABD-934D-88EC-D797CA1C67D6}" type="datetimeFigureOut">
               <a:rPr lang="en-US" smtClean="0"/>
-              <a:t>3/2/21</a:t>
+              <a:t>3/3/2021</a:t>
             </a:fld>
             <a:endParaRPr lang="en-US"/>
           </a:p>
@@ -2663,7 +2668,7 @@
           <a:p>
             <a:fld id="{8C5C7583-DABD-934D-88EC-D797CA1C67D6}" type="datetimeFigureOut">
               <a:rPr lang="en-US" smtClean="0"/>
-              <a:t>3/2/21</a:t>
+              <a:t>3/3/2021</a:t>
             </a:fld>
             <a:endParaRPr lang="en-US"/>
           </a:p>
@@ -2904,7 +2909,7 @@
           <a:p>
             <a:fld id="{8C5C7583-DABD-934D-88EC-D797CA1C67D6}" type="datetimeFigureOut">
               <a:rPr lang="en-US" smtClean="0"/>
-              <a:t>3/2/21</a:t>
+              <a:t>3/3/2021</a:t>
             </a:fld>
             <a:endParaRPr lang="en-US"/>
           </a:p>
@@ -3332,15 +3337,14 @@
           </p:cNvPr>
           <p:cNvCxnSpPr>
             <a:cxnSpLocks/>
-            <a:stCxn id="57" idx="4"/>
             <a:endCxn id="52" idx="1"/>
           </p:cNvCxnSpPr>
           <p:nvPr/>
         </p:nvCxnSpPr>
         <p:spPr>
           <a:xfrm>
-            <a:off x="838786" y="2300336"/>
-            <a:ext cx="984230" cy="659339"/>
+            <a:off x="1390312" y="1910213"/>
+            <a:ext cx="743854" cy="966912"/>
           </a:xfrm>
           <a:prstGeom prst="straightConnector1">
             <a:avLst/>
@@ -3375,14 +3379,13 @@
           </p:cNvPr>
           <p:cNvCxnSpPr>
             <a:cxnSpLocks/>
-            <a:stCxn id="56" idx="4"/>
           </p:cNvCxnSpPr>
           <p:nvPr/>
         </p:nvCxnSpPr>
         <p:spPr>
           <a:xfrm>
-            <a:off x="2516976" y="2104921"/>
-            <a:ext cx="340117" cy="299369"/>
+            <a:off x="2839849" y="1944062"/>
+            <a:ext cx="224377" cy="431767"/>
           </a:xfrm>
           <a:prstGeom prst="straightConnector1">
             <a:avLst/>
@@ -3417,14 +3420,13 @@
           </p:cNvPr>
           <p:cNvCxnSpPr>
             <a:cxnSpLocks/>
-            <a:stCxn id="55" idx="4"/>
           </p:cNvCxnSpPr>
           <p:nvPr/>
         </p:nvCxnSpPr>
         <p:spPr>
           <a:xfrm flipH="1">
-            <a:off x="4635790" y="2080677"/>
-            <a:ext cx="489903" cy="472659"/>
+            <a:off x="4946941" y="1964260"/>
+            <a:ext cx="227298" cy="506526"/>
           </a:xfrm>
           <a:prstGeom prst="straightConnector1">
             <a:avLst/>
@@ -3465,8 +3467,8 @@
         </p:nvCxnSpPr>
         <p:spPr>
           <a:xfrm flipH="1">
-            <a:off x="1336649" y="868226"/>
-            <a:ext cx="1775656" cy="768156"/>
+            <a:off x="1523523" y="740662"/>
+            <a:ext cx="1942082" cy="566615"/>
           </a:xfrm>
           <a:prstGeom prst="straightConnector1">
             <a:avLst/>
@@ -3501,15 +3503,13 @@
           </p:cNvPr>
           <p:cNvCxnSpPr>
             <a:cxnSpLocks/>
-            <a:stCxn id="58" idx="3"/>
-            <a:endCxn id="56" idx="0"/>
           </p:cNvCxnSpPr>
           <p:nvPr/>
         </p:nvCxnSpPr>
         <p:spPr>
           <a:xfrm flipH="1">
-            <a:off x="2516976" y="958991"/>
-            <a:ext cx="727326" cy="393158"/>
+            <a:off x="3064226" y="830087"/>
+            <a:ext cx="549665" cy="429892"/>
           </a:xfrm>
           <a:prstGeom prst="straightConnector1">
             <a:avLst/>
@@ -3545,14 +3545,13 @@
           <p:cNvCxnSpPr>
             <a:cxnSpLocks/>
             <a:stCxn id="58" idx="5"/>
-            <a:endCxn id="55" idx="0"/>
           </p:cNvCxnSpPr>
           <p:nvPr/>
         </p:nvCxnSpPr>
         <p:spPr>
           <a:xfrm>
-            <a:off x="4286818" y="958991"/>
-            <a:ext cx="838875" cy="383538"/>
+            <a:off x="4597968" y="876441"/>
+            <a:ext cx="452166" cy="449127"/>
           </a:xfrm>
           <a:prstGeom prst="straightConnector1">
             <a:avLst/>
@@ -3590,7 +3589,7 @@
         </p:nvSpPr>
         <p:spPr>
           <a:xfrm>
-            <a:off x="3028390" y="436430"/>
+            <a:off x="3339540" y="353880"/>
             <a:ext cx="1474340" cy="612218"/>
           </a:xfrm>
           <a:prstGeom prst="ellipse">
@@ -3642,7 +3641,7 @@
         </p:nvSpPr>
         <p:spPr>
           <a:xfrm>
-            <a:off x="1100138" y="2326005"/>
+            <a:off x="1411288" y="2243455"/>
             <a:ext cx="4936118" cy="4326970"/>
           </a:xfrm>
           <a:prstGeom prst="ellipse">
@@ -3694,7 +3693,7 @@
         </p:nvSpPr>
         <p:spPr>
           <a:xfrm>
-            <a:off x="3071813" y="2799721"/>
+            <a:off x="3382963" y="2717171"/>
             <a:ext cx="1138197" cy="369332"/>
           </a:xfrm>
           <a:prstGeom prst="rect">
@@ -3737,7 +3736,7 @@
         </p:nvSpPr>
         <p:spPr>
           <a:xfrm>
-            <a:off x="3737480" y="3748569"/>
+            <a:off x="4559585" y="3651760"/>
             <a:ext cx="1334020" cy="369332"/>
           </a:xfrm>
           <a:prstGeom prst="rect">
@@ -3773,7 +3772,7 @@
         </p:nvSpPr>
         <p:spPr>
           <a:xfrm>
-            <a:off x="1763493" y="5598795"/>
+            <a:off x="3026078" y="5419643"/>
             <a:ext cx="1437573" cy="369332"/>
           </a:xfrm>
           <a:prstGeom prst="rect">
@@ -3809,7 +3808,7 @@
         </p:nvGrpSpPr>
         <p:grpSpPr>
           <a:xfrm>
-            <a:off x="4441060" y="1342529"/>
+            <a:off x="4752210" y="1259979"/>
             <a:ext cx="1369265" cy="738148"/>
             <a:chOff x="4640366" y="1336875"/>
             <a:chExt cx="1369265" cy="738148"/>
@@ -3918,7 +3917,7 @@
         </p:nvSpPr>
         <p:spPr>
           <a:xfrm>
-            <a:off x="1540734" y="3536982"/>
+            <a:off x="1851884" y="3454432"/>
             <a:ext cx="1812163" cy="369332"/>
           </a:xfrm>
           <a:prstGeom prst="rect">
@@ -3954,7 +3953,7 @@
         </p:nvSpPr>
         <p:spPr>
           <a:xfrm>
-            <a:off x="3731769" y="4752499"/>
+            <a:off x="4658529" y="4916115"/>
             <a:ext cx="1048236" cy="369332"/>
           </a:xfrm>
           <a:prstGeom prst="rect">
@@ -3990,7 +3989,7 @@
         </p:nvSpPr>
         <p:spPr>
           <a:xfrm>
-            <a:off x="3302741" y="551583"/>
+            <a:off x="3613891" y="469033"/>
             <a:ext cx="953146" cy="369332"/>
           </a:xfrm>
           <a:prstGeom prst="rect">
@@ -4026,7 +4025,7 @@
         </p:nvSpPr>
         <p:spPr>
           <a:xfrm>
-            <a:off x="2170636" y="4250534"/>
+            <a:off x="3184342" y="4426017"/>
             <a:ext cx="1677062" cy="369332"/>
           </a:xfrm>
           <a:prstGeom prst="rect">
@@ -4062,7 +4061,7 @@
         </p:nvSpPr>
         <p:spPr>
           <a:xfrm>
-            <a:off x="3483982" y="5612487"/>
+            <a:off x="2785832" y="5902701"/>
             <a:ext cx="1841017" cy="369332"/>
           </a:xfrm>
           <a:prstGeom prst="rect">
@@ -4098,15 +4097,14 @@
             </a:extLst>
           </p:cNvPr>
           <p:cNvCxnSpPr>
-            <a:stCxn id="4" idx="2"/>
-            <a:endCxn id="5" idx="0"/>
+            <a:cxnSpLocks/>
           </p:cNvCxnSpPr>
           <p:nvPr/>
         </p:nvCxnSpPr>
         <p:spPr>
           <a:xfrm>
-            <a:off x="3640912" y="3169053"/>
-            <a:ext cx="763578" cy="579516"/>
+            <a:off x="4249300" y="3066787"/>
+            <a:ext cx="612104" cy="644887"/>
           </a:xfrm>
           <a:prstGeom prst="straightConnector1">
             <a:avLst/>
@@ -4141,15 +4139,13 @@
           </p:cNvPr>
           <p:cNvCxnSpPr>
             <a:cxnSpLocks/>
-            <a:stCxn id="4" idx="2"/>
-            <a:endCxn id="8" idx="0"/>
           </p:cNvCxnSpPr>
           <p:nvPr/>
         </p:nvCxnSpPr>
         <p:spPr>
           <a:xfrm flipH="1">
-            <a:off x="2446816" y="3169053"/>
-            <a:ext cx="1194096" cy="367929"/>
+            <a:off x="3139666" y="3064888"/>
+            <a:ext cx="560994" cy="442233"/>
           </a:xfrm>
           <a:prstGeom prst="straightConnector1">
             <a:avLst/>
@@ -4184,15 +4180,13 @@
           </p:cNvPr>
           <p:cNvCxnSpPr>
             <a:cxnSpLocks/>
-            <a:stCxn id="5" idx="2"/>
-            <a:endCxn id="11" idx="0"/>
           </p:cNvCxnSpPr>
           <p:nvPr/>
         </p:nvCxnSpPr>
         <p:spPr>
           <a:xfrm flipH="1">
-            <a:off x="3009167" y="4117901"/>
-            <a:ext cx="1395323" cy="132633"/>
+            <a:off x="4580561" y="3999113"/>
+            <a:ext cx="322911" cy="470862"/>
           </a:xfrm>
           <a:prstGeom prst="straightConnector1">
             <a:avLst/>
@@ -4227,15 +4221,13 @@
           </p:cNvPr>
           <p:cNvCxnSpPr>
             <a:cxnSpLocks/>
-            <a:stCxn id="11" idx="2"/>
-            <a:endCxn id="9" idx="0"/>
           </p:cNvCxnSpPr>
           <p:nvPr/>
         </p:nvCxnSpPr>
         <p:spPr>
           <a:xfrm>
-            <a:off x="3009167" y="4619866"/>
-            <a:ext cx="1246720" cy="132633"/>
+            <a:off x="4798725" y="4759259"/>
+            <a:ext cx="251409" cy="196422"/>
           </a:xfrm>
           <a:prstGeom prst="straightConnector1">
             <a:avLst/>
@@ -4277,8 +4269,8 @@
         </p:nvCxnSpPr>
         <p:spPr>
           <a:xfrm flipH="1">
-            <a:off x="4255887" y="4117901"/>
-            <a:ext cx="148603" cy="634598"/>
+            <a:off x="5182647" y="4021092"/>
+            <a:ext cx="43948" cy="895023"/>
           </a:xfrm>
           <a:prstGeom prst="straightConnector1">
             <a:avLst/>
@@ -4313,15 +4305,13 @@
           </p:cNvPr>
           <p:cNvCxnSpPr>
             <a:cxnSpLocks/>
-            <a:stCxn id="9" idx="2"/>
-            <a:endCxn id="6" idx="0"/>
           </p:cNvCxnSpPr>
           <p:nvPr/>
         </p:nvCxnSpPr>
         <p:spPr>
           <a:xfrm flipH="1">
-            <a:off x="2482280" y="5121831"/>
-            <a:ext cx="1773607" cy="476964"/>
+            <a:off x="4384378" y="5261113"/>
+            <a:ext cx="429502" cy="245003"/>
           </a:xfrm>
           <a:prstGeom prst="straightConnector1">
             <a:avLst/>
@@ -4356,15 +4346,13 @@
           </p:cNvPr>
           <p:cNvCxnSpPr>
             <a:cxnSpLocks/>
-            <a:stCxn id="9" idx="2"/>
-            <a:endCxn id="12" idx="0"/>
           </p:cNvCxnSpPr>
           <p:nvPr/>
         </p:nvCxnSpPr>
         <p:spPr>
-          <a:xfrm>
-            <a:off x="4255887" y="5121831"/>
-            <a:ext cx="148604" cy="490656"/>
+          <a:xfrm flipH="1">
+            <a:off x="4559585" y="5311116"/>
+            <a:ext cx="622855" cy="663760"/>
           </a:xfrm>
           <a:prstGeom prst="straightConnector1">
             <a:avLst/>
@@ -4402,8 +4390,8 @@
         </p:nvGrpSpPr>
         <p:grpSpPr>
           <a:xfrm>
-            <a:off x="1779806" y="1352149"/>
-            <a:ext cx="1474340" cy="752772"/>
+            <a:off x="1946823" y="1212007"/>
+            <a:ext cx="1443852" cy="752772"/>
             <a:chOff x="1726726" y="1274805"/>
             <a:chExt cx="1474340" cy="752772"/>
           </a:xfrm>
@@ -4511,7 +4499,7 @@
         </p:nvGrpSpPr>
         <p:grpSpPr>
           <a:xfrm>
-            <a:off x="134701" y="1522465"/>
+            <a:off x="321575" y="1193360"/>
             <a:ext cx="1408170" cy="777871"/>
             <a:chOff x="135794" y="1203914"/>
             <a:chExt cx="1408170" cy="777871"/>
@@ -4617,15 +4605,13 @@
           </p:cNvPr>
           <p:cNvCxnSpPr>
             <a:cxnSpLocks/>
-            <a:stCxn id="51" idx="3"/>
-            <a:endCxn id="4" idx="0"/>
           </p:cNvCxnSpPr>
           <p:nvPr/>
         </p:nvCxnSpPr>
         <p:spPr>
           <a:xfrm>
-            <a:off x="1371882" y="1907695"/>
-            <a:ext cx="2269030" cy="892026"/>
+            <a:off x="1510697" y="1695080"/>
+            <a:ext cx="1954908" cy="1093031"/>
           </a:xfrm>
           <a:prstGeom prst="straightConnector1">
             <a:avLst/>
@@ -4660,15 +4646,13 @@
           </p:cNvPr>
           <p:cNvCxnSpPr>
             <a:cxnSpLocks/>
-            <a:stCxn id="50" idx="2"/>
-            <a:endCxn id="4" idx="0"/>
           </p:cNvCxnSpPr>
           <p:nvPr/>
         </p:nvCxnSpPr>
         <p:spPr>
           <a:xfrm>
-            <a:off x="2534699" y="1895821"/>
-            <a:ext cx="1106213" cy="903900"/>
+            <a:off x="2864321" y="1736822"/>
+            <a:ext cx="932335" cy="980349"/>
           </a:xfrm>
           <a:prstGeom prst="straightConnector1">
             <a:avLst/>
@@ -4703,15 +4687,13 @@
           </p:cNvPr>
           <p:cNvCxnSpPr>
             <a:cxnSpLocks/>
-            <a:stCxn id="7" idx="2"/>
-            <a:endCxn id="4" idx="0"/>
           </p:cNvCxnSpPr>
           <p:nvPr/>
         </p:nvCxnSpPr>
         <p:spPr>
           <a:xfrm flipH="1">
-            <a:off x="3640912" y="1891797"/>
-            <a:ext cx="1480831" cy="907924"/>
+            <a:off x="4329339" y="1781809"/>
+            <a:ext cx="717601" cy="988042"/>
           </a:xfrm>
           <a:prstGeom prst="straightConnector1">
             <a:avLst/>
@@ -4746,15 +4728,13 @@
           </p:cNvPr>
           <p:cNvCxnSpPr>
             <a:cxnSpLocks/>
-            <a:stCxn id="10" idx="2"/>
-            <a:endCxn id="8" idx="0"/>
           </p:cNvCxnSpPr>
           <p:nvPr/>
         </p:nvCxnSpPr>
         <p:spPr>
           <a:xfrm flipH="1">
-            <a:off x="2446816" y="920915"/>
-            <a:ext cx="1332498" cy="2616067"/>
+            <a:off x="2960234" y="802912"/>
+            <a:ext cx="901570" cy="2695455"/>
           </a:xfrm>
           <a:prstGeom prst="straightConnector1">
             <a:avLst/>
@@ -4789,15 +4769,13 @@
           </p:cNvPr>
           <p:cNvCxnSpPr>
             <a:cxnSpLocks/>
-            <a:stCxn id="10" idx="2"/>
-            <a:endCxn id="5" idx="0"/>
           </p:cNvCxnSpPr>
           <p:nvPr/>
         </p:nvCxnSpPr>
         <p:spPr>
           <a:xfrm>
-            <a:off x="3779314" y="920915"/>
-            <a:ext cx="625176" cy="2827654"/>
+            <a:off x="4300606" y="802912"/>
+            <a:ext cx="735733" cy="2880121"/>
           </a:xfrm>
           <a:prstGeom prst="straightConnector1">
             <a:avLst/>
@@ -4837,7 +4815,7 @@
         </p:nvCxnSpPr>
         <p:spPr>
           <a:xfrm>
-            <a:off x="6925427" y="933476"/>
+            <a:off x="7236577" y="850926"/>
             <a:ext cx="763845" cy="0"/>
           </a:xfrm>
           <a:prstGeom prst="straightConnector1">
@@ -4878,7 +4856,7 @@
         </p:nvCxnSpPr>
         <p:spPr>
           <a:xfrm flipV="1">
-            <a:off x="6942688" y="1803084"/>
+            <a:off x="7241526" y="2112646"/>
             <a:ext cx="746584" cy="9359"/>
           </a:xfrm>
           <a:prstGeom prst="straightConnector1">
@@ -4919,7 +4897,7 @@
         </p:nvCxnSpPr>
         <p:spPr>
           <a:xfrm flipV="1">
-            <a:off x="6942688" y="1395169"/>
+            <a:off x="7253838" y="1312619"/>
             <a:ext cx="746584" cy="2096"/>
           </a:xfrm>
           <a:prstGeom prst="straightConnector1">
@@ -4958,7 +4936,7 @@
         </p:nvSpPr>
         <p:spPr>
           <a:xfrm>
-            <a:off x="7689272" y="745700"/>
+            <a:off x="8000422" y="663150"/>
             <a:ext cx="1983235" cy="369332"/>
           </a:xfrm>
           <a:prstGeom prst="rect">
@@ -4993,8 +4971,8 @@
         </p:nvSpPr>
         <p:spPr>
           <a:xfrm>
-            <a:off x="7689272" y="1168717"/>
-            <a:ext cx="3240502" cy="369332"/>
+            <a:off x="8000422" y="1086167"/>
+            <a:ext cx="3977627" cy="369332"/>
           </a:xfrm>
           <a:prstGeom prst="rect">
             <a:avLst/>
@@ -5009,7 +4987,7 @@
           <a:p>
             <a:r>
               <a:rPr lang="en-US" dirty="0"/>
-              <a:t>within-object target dependency</a:t>
+              <a:t>explicit within-object target dependency</a:t>
             </a:r>
           </a:p>
         </p:txBody>
@@ -5028,7 +5006,7 @@
         </p:nvSpPr>
         <p:spPr>
           <a:xfrm>
-            <a:off x="7689272" y="1587986"/>
+            <a:off x="7988110" y="1897548"/>
             <a:ext cx="3252814" cy="369332"/>
           </a:xfrm>
           <a:prstGeom prst="rect">
@@ -5063,7 +5041,7 @@
         </p:nvSpPr>
         <p:spPr>
           <a:xfrm>
-            <a:off x="7007192" y="2353708"/>
+            <a:off x="7318342" y="2271158"/>
             <a:ext cx="1364476" cy="369332"/>
           </a:xfrm>
           <a:prstGeom prst="rect">
@@ -5098,7 +5076,7 @@
         </p:nvSpPr>
         <p:spPr>
           <a:xfrm>
-            <a:off x="6874788" y="2951010"/>
+            <a:off x="7185938" y="2868460"/>
             <a:ext cx="1913078" cy="364478"/>
           </a:xfrm>
           <a:prstGeom prst="ellipse">
@@ -5157,7 +5135,7 @@
         </p:nvSpPr>
         <p:spPr>
           <a:xfrm>
-            <a:off x="6874788" y="3447472"/>
+            <a:off x="7185938" y="3364922"/>
             <a:ext cx="1913078" cy="364478"/>
           </a:xfrm>
           <a:prstGeom prst="ellipse">
@@ -5221,7 +5199,7 @@
         </p:nvSpPr>
         <p:spPr>
           <a:xfrm>
-            <a:off x="6874787" y="3960286"/>
+            <a:off x="7185937" y="3877736"/>
             <a:ext cx="1913078" cy="364478"/>
           </a:xfrm>
           <a:prstGeom prst="ellipse">
@@ -5262,6 +5240,571 @@
                 </a:solidFill>
               </a:rPr>
               <a:t>sample</a:t>
+            </a:r>
+          </a:p>
+        </p:txBody>
+      </p:sp>
+      <p:sp>
+        <p:nvSpPr>
+          <p:cNvPr id="49" name="TextBox 48">
+            <a:extLst>
+              <a:ext uri="{FF2B5EF4-FFF2-40B4-BE49-F238E27FC236}">
+                <a16:creationId xmlns:a16="http://schemas.microsoft.com/office/drawing/2014/main" id="{8DEED36A-F60F-4F31-9023-0F4EFB98CDF4}"/>
+              </a:ext>
+            </a:extLst>
+          </p:cNvPr>
+          <p:cNvSpPr txBox="1"/>
+          <p:nvPr/>
+        </p:nvSpPr>
+        <p:spPr>
+          <a:xfrm>
+            <a:off x="1716079" y="4782687"/>
+            <a:ext cx="1020151" cy="369332"/>
+          </a:xfrm>
+          <a:prstGeom prst="rect">
+            <a:avLst/>
+          </a:prstGeom>
+          <a:noFill/>
+        </p:spPr>
+        <p:txBody>
+          <a:bodyPr wrap="none" rtlCol="0">
+            <a:spAutoFit/>
+          </a:bodyPr>
+          <a:lstStyle/>
+          <a:p>
+            <a:r>
+              <a:rPr lang="en-US" dirty="0"/>
+              <a:t>[</a:t>
+            </a:r>
+            <a:r>
+              <a:rPr lang="en-US" dirty="0" err="1"/>
+              <a:t>obj.flag</a:t>
+            </a:r>
+            <a:r>
+              <a:rPr lang="en-US" dirty="0"/>
+              <a:t>]</a:t>
+            </a:r>
+          </a:p>
+        </p:txBody>
+      </p:sp>
+      <p:cxnSp>
+        <p:nvCxnSpPr>
+          <p:cNvPr id="60" name="Straight Arrow Connector 59">
+            <a:extLst>
+              <a:ext uri="{FF2B5EF4-FFF2-40B4-BE49-F238E27FC236}">
+                <a16:creationId xmlns:a16="http://schemas.microsoft.com/office/drawing/2014/main" id="{444DAECD-5329-49A5-B077-54DB5545D065}"/>
+              </a:ext>
+            </a:extLst>
+          </p:cNvPr>
+          <p:cNvCxnSpPr>
+            <a:cxnSpLocks/>
+          </p:cNvCxnSpPr>
+          <p:nvPr/>
+        </p:nvCxnSpPr>
+        <p:spPr>
+          <a:xfrm flipH="1">
+            <a:off x="2072606" y="3845379"/>
+            <a:ext cx="767849" cy="984734"/>
+          </a:xfrm>
+          <a:prstGeom prst="straightConnector1">
+            <a:avLst/>
+          </a:prstGeom>
+          <a:ln w="19050">
+            <a:prstDash val="sysDash"/>
+            <a:tailEnd type="triangle"/>
+          </a:ln>
+        </p:spPr>
+        <p:style>
+          <a:lnRef idx="1">
+            <a:schemeClr val="accent1"/>
+          </a:lnRef>
+          <a:fillRef idx="0">
+            <a:schemeClr val="accent1"/>
+          </a:fillRef>
+          <a:effectRef idx="0">
+            <a:schemeClr val="accent1"/>
+          </a:effectRef>
+          <a:fontRef idx="minor">
+            <a:schemeClr val="tx1"/>
+          </a:fontRef>
+        </p:style>
+      </p:cxnSp>
+      <p:cxnSp>
+        <p:nvCxnSpPr>
+          <p:cNvPr id="61" name="Straight Arrow Connector 60">
+            <a:extLst>
+              <a:ext uri="{FF2B5EF4-FFF2-40B4-BE49-F238E27FC236}">
+                <a16:creationId xmlns:a16="http://schemas.microsoft.com/office/drawing/2014/main" id="{16DC1F87-10D5-4EF6-9066-EFEA0710506C}"/>
+              </a:ext>
+            </a:extLst>
+          </p:cNvPr>
+          <p:cNvCxnSpPr>
+            <a:cxnSpLocks/>
+          </p:cNvCxnSpPr>
+          <p:nvPr/>
+        </p:nvCxnSpPr>
+        <p:spPr>
+          <a:xfrm flipH="1">
+            <a:off x="2345811" y="3955257"/>
+            <a:ext cx="2264184" cy="874856"/>
+          </a:xfrm>
+          <a:prstGeom prst="straightConnector1">
+            <a:avLst/>
+          </a:prstGeom>
+          <a:ln w="19050">
+            <a:prstDash val="sysDash"/>
+            <a:tailEnd type="triangle"/>
+          </a:ln>
+        </p:spPr>
+        <p:style>
+          <a:lnRef idx="1">
+            <a:schemeClr val="accent1"/>
+          </a:lnRef>
+          <a:fillRef idx="0">
+            <a:schemeClr val="accent1"/>
+          </a:fillRef>
+          <a:effectRef idx="0">
+            <a:schemeClr val="accent1"/>
+          </a:effectRef>
+          <a:fontRef idx="minor">
+            <a:schemeClr val="tx1"/>
+          </a:fontRef>
+        </p:style>
+      </p:cxnSp>
+      <p:cxnSp>
+        <p:nvCxnSpPr>
+          <p:cNvPr id="63" name="Straight Arrow Connector 62">
+            <a:extLst>
+              <a:ext uri="{FF2B5EF4-FFF2-40B4-BE49-F238E27FC236}">
+                <a16:creationId xmlns:a16="http://schemas.microsoft.com/office/drawing/2014/main" id="{F322042D-A288-419B-87AD-1D0917C9F504}"/>
+              </a:ext>
+            </a:extLst>
+          </p:cNvPr>
+          <p:cNvCxnSpPr>
+            <a:cxnSpLocks/>
+          </p:cNvCxnSpPr>
+          <p:nvPr/>
+        </p:nvCxnSpPr>
+        <p:spPr>
+          <a:xfrm flipH="1">
+            <a:off x="2651179" y="4731536"/>
+            <a:ext cx="569323" cy="154047"/>
+          </a:xfrm>
+          <a:prstGeom prst="straightConnector1">
+            <a:avLst/>
+          </a:prstGeom>
+          <a:ln w="19050">
+            <a:prstDash val="sysDash"/>
+            <a:tailEnd type="triangle"/>
+          </a:ln>
+        </p:spPr>
+        <p:style>
+          <a:lnRef idx="1">
+            <a:schemeClr val="accent1"/>
+          </a:lnRef>
+          <a:fillRef idx="0">
+            <a:schemeClr val="accent1"/>
+          </a:fillRef>
+          <a:effectRef idx="0">
+            <a:schemeClr val="accent1"/>
+          </a:effectRef>
+          <a:fontRef idx="minor">
+            <a:schemeClr val="tx1"/>
+          </a:fontRef>
+        </p:style>
+      </p:cxnSp>
+      <p:cxnSp>
+        <p:nvCxnSpPr>
+          <p:cNvPr id="69" name="Straight Arrow Connector 68">
+            <a:extLst>
+              <a:ext uri="{FF2B5EF4-FFF2-40B4-BE49-F238E27FC236}">
+                <a16:creationId xmlns:a16="http://schemas.microsoft.com/office/drawing/2014/main" id="{0E849290-DA43-4BBE-A28E-6D0745A7B872}"/>
+              </a:ext>
+            </a:extLst>
+          </p:cNvPr>
+          <p:cNvCxnSpPr>
+            <a:cxnSpLocks/>
+            <a:stCxn id="9" idx="1"/>
+            <a:endCxn id="49" idx="3"/>
+          </p:cNvCxnSpPr>
+          <p:nvPr/>
+        </p:nvCxnSpPr>
+        <p:spPr>
+          <a:xfrm flipH="1" flipV="1">
+            <a:off x="2736230" y="4967353"/>
+            <a:ext cx="1922299" cy="133428"/>
+          </a:xfrm>
+          <a:prstGeom prst="straightConnector1">
+            <a:avLst/>
+          </a:prstGeom>
+          <a:ln w="19050">
+            <a:prstDash val="sysDash"/>
+            <a:tailEnd type="triangle"/>
+          </a:ln>
+        </p:spPr>
+        <p:style>
+          <a:lnRef idx="1">
+            <a:schemeClr val="accent1"/>
+          </a:lnRef>
+          <a:fillRef idx="0">
+            <a:schemeClr val="accent1"/>
+          </a:fillRef>
+          <a:effectRef idx="0">
+            <a:schemeClr val="accent1"/>
+          </a:effectRef>
+          <a:fontRef idx="minor">
+            <a:schemeClr val="tx1"/>
+          </a:fontRef>
+        </p:style>
+      </p:cxnSp>
+      <p:cxnSp>
+        <p:nvCxnSpPr>
+          <p:cNvPr id="72" name="Straight Arrow Connector 71">
+            <a:extLst>
+              <a:ext uri="{FF2B5EF4-FFF2-40B4-BE49-F238E27FC236}">
+                <a16:creationId xmlns:a16="http://schemas.microsoft.com/office/drawing/2014/main" id="{8FDECD81-D219-4745-A858-074EEA7D7F25}"/>
+              </a:ext>
+            </a:extLst>
+          </p:cNvPr>
+          <p:cNvCxnSpPr>
+            <a:cxnSpLocks/>
+          </p:cNvCxnSpPr>
+          <p:nvPr/>
+        </p:nvCxnSpPr>
+        <p:spPr>
+          <a:xfrm flipH="1" flipV="1">
+            <a:off x="2651179" y="5100781"/>
+            <a:ext cx="421546" cy="380112"/>
+          </a:xfrm>
+          <a:prstGeom prst="straightConnector1">
+            <a:avLst/>
+          </a:prstGeom>
+          <a:ln w="19050">
+            <a:prstDash val="sysDash"/>
+            <a:tailEnd type="triangle"/>
+          </a:ln>
+        </p:spPr>
+        <p:style>
+          <a:lnRef idx="1">
+            <a:schemeClr val="accent1"/>
+          </a:lnRef>
+          <a:fillRef idx="0">
+            <a:schemeClr val="accent1"/>
+          </a:fillRef>
+          <a:effectRef idx="0">
+            <a:schemeClr val="accent1"/>
+          </a:effectRef>
+          <a:fontRef idx="minor">
+            <a:schemeClr val="tx1"/>
+          </a:fontRef>
+        </p:style>
+      </p:cxnSp>
+      <p:cxnSp>
+        <p:nvCxnSpPr>
+          <p:cNvPr id="87" name="Straight Arrow Connector 86">
+            <a:extLst>
+              <a:ext uri="{FF2B5EF4-FFF2-40B4-BE49-F238E27FC236}">
+                <a16:creationId xmlns:a16="http://schemas.microsoft.com/office/drawing/2014/main" id="{7164DC77-7D32-4972-AD80-E2D7D1F47A0B}"/>
+              </a:ext>
+            </a:extLst>
+          </p:cNvPr>
+          <p:cNvCxnSpPr>
+            <a:cxnSpLocks/>
+            <a:endCxn id="49" idx="2"/>
+          </p:cNvCxnSpPr>
+          <p:nvPr/>
+        </p:nvCxnSpPr>
+        <p:spPr>
+          <a:xfrm flipH="1" flipV="1">
+            <a:off x="2226155" y="5152019"/>
+            <a:ext cx="646194" cy="802652"/>
+          </a:xfrm>
+          <a:prstGeom prst="straightConnector1">
+            <a:avLst/>
+          </a:prstGeom>
+          <a:ln w="19050">
+            <a:prstDash val="sysDash"/>
+            <a:tailEnd type="triangle"/>
+          </a:ln>
+        </p:spPr>
+        <p:style>
+          <a:lnRef idx="1">
+            <a:schemeClr val="accent1"/>
+          </a:lnRef>
+          <a:fillRef idx="0">
+            <a:schemeClr val="accent1"/>
+          </a:fillRef>
+          <a:effectRef idx="0">
+            <a:schemeClr val="accent1"/>
+          </a:effectRef>
+          <a:fontRef idx="minor">
+            <a:schemeClr val="tx1"/>
+          </a:fontRef>
+        </p:style>
+      </p:cxnSp>
+      <p:sp>
+        <p:nvSpPr>
+          <p:cNvPr id="148" name="TextBox 147">
+            <a:extLst>
+              <a:ext uri="{FF2B5EF4-FFF2-40B4-BE49-F238E27FC236}">
+                <a16:creationId xmlns:a16="http://schemas.microsoft.com/office/drawing/2014/main" id="{F8443880-9BFD-4DBD-AFDA-672C90EA5437}"/>
+              </a:ext>
+            </a:extLst>
+          </p:cNvPr>
+          <p:cNvSpPr txBox="1"/>
+          <p:nvPr/>
+        </p:nvSpPr>
+        <p:spPr>
+          <a:xfrm>
+            <a:off x="5659261" y="2236054"/>
+            <a:ext cx="1191547" cy="461665"/>
+          </a:xfrm>
+          <a:prstGeom prst="rect">
+            <a:avLst/>
+          </a:prstGeom>
+          <a:ln>
+            <a:prstDash val="sysDot"/>
+          </a:ln>
+        </p:spPr>
+        <p:style>
+          <a:lnRef idx="2">
+            <a:schemeClr val="accent3"/>
+          </a:lnRef>
+          <a:fillRef idx="1">
+            <a:schemeClr val="lt1"/>
+          </a:fillRef>
+          <a:effectRef idx="0">
+            <a:schemeClr val="accent3"/>
+          </a:effectRef>
+          <a:fontRef idx="minor">
+            <a:schemeClr val="dk1"/>
+          </a:fontRef>
+        </p:style>
+        <p:txBody>
+          <a:bodyPr wrap="square" rtlCol="0">
+            <a:spAutoFit/>
+          </a:bodyPr>
+          <a:lstStyle/>
+          <a:p>
+            <a:r>
+              <a:rPr lang="en-US" sz="1200" dirty="0"/>
+              <a:t>temporary target</a:t>
+            </a:r>
+          </a:p>
+        </p:txBody>
+      </p:sp>
+      <p:cxnSp>
+        <p:nvCxnSpPr>
+          <p:cNvPr id="151" name="Straight Connector 150">
+            <a:extLst>
+              <a:ext uri="{FF2B5EF4-FFF2-40B4-BE49-F238E27FC236}">
+                <a16:creationId xmlns:a16="http://schemas.microsoft.com/office/drawing/2014/main" id="{CF4BDE31-A48B-47CF-89F0-D8C2FD0B7DA7}"/>
+              </a:ext>
+            </a:extLst>
+          </p:cNvPr>
+          <p:cNvCxnSpPr>
+            <a:stCxn id="4" idx="3"/>
+            <a:endCxn id="148" idx="1"/>
+          </p:cNvCxnSpPr>
+          <p:nvPr/>
+        </p:nvCxnSpPr>
+        <p:spPr>
+          <a:xfrm flipV="1">
+            <a:off x="4521160" y="2466887"/>
+            <a:ext cx="1138101" cy="434950"/>
+          </a:xfrm>
+          <a:prstGeom prst="line">
+            <a:avLst/>
+          </a:prstGeom>
+        </p:spPr>
+        <p:style>
+          <a:lnRef idx="1">
+            <a:schemeClr val="accent3"/>
+          </a:lnRef>
+          <a:fillRef idx="0">
+            <a:schemeClr val="accent3"/>
+          </a:fillRef>
+          <a:effectRef idx="0">
+            <a:schemeClr val="accent3"/>
+          </a:effectRef>
+          <a:fontRef idx="minor">
+            <a:schemeClr val="tx1"/>
+          </a:fontRef>
+        </p:style>
+      </p:cxnSp>
+      <p:sp>
+        <p:nvSpPr>
+          <p:cNvPr id="166" name="TextBox 165">
+            <a:extLst>
+              <a:ext uri="{FF2B5EF4-FFF2-40B4-BE49-F238E27FC236}">
+                <a16:creationId xmlns:a16="http://schemas.microsoft.com/office/drawing/2014/main" id="{357D2A7D-0C11-4B82-8808-FCCA93ACC56B}"/>
+              </a:ext>
+            </a:extLst>
+          </p:cNvPr>
+          <p:cNvSpPr txBox="1"/>
+          <p:nvPr/>
+        </p:nvSpPr>
+        <p:spPr>
+          <a:xfrm>
+            <a:off x="479019" y="5954671"/>
+            <a:ext cx="1191547" cy="461665"/>
+          </a:xfrm>
+          <a:prstGeom prst="rect">
+            <a:avLst/>
+          </a:prstGeom>
+          <a:ln>
+            <a:prstDash val="sysDot"/>
+          </a:ln>
+        </p:spPr>
+        <p:style>
+          <a:lnRef idx="2">
+            <a:schemeClr val="accent3"/>
+          </a:lnRef>
+          <a:fillRef idx="1">
+            <a:schemeClr val="lt1"/>
+          </a:fillRef>
+          <a:effectRef idx="0">
+            <a:schemeClr val="accent3"/>
+          </a:effectRef>
+          <a:fontRef idx="minor">
+            <a:schemeClr val="dk1"/>
+          </a:fontRef>
+        </p:style>
+        <p:txBody>
+          <a:bodyPr wrap="square" rtlCol="0">
+            <a:spAutoFit/>
+          </a:bodyPr>
+          <a:lstStyle/>
+          <a:p>
+            <a:r>
+              <a:rPr lang="en-US" sz="1200" dirty="0"/>
+              <a:t>The implicit</a:t>
+            </a:r>
+          </a:p>
+          <a:p>
+            <a:r>
+              <a:rPr lang="en-US" sz="1200" dirty="0" err="1"/>
+              <a:t>obj.flag</a:t>
+            </a:r>
+            <a:r>
+              <a:rPr lang="en-US" sz="1200" dirty="0"/>
+              <a:t> target</a:t>
+            </a:r>
+          </a:p>
+        </p:txBody>
+      </p:sp>
+      <p:cxnSp>
+        <p:nvCxnSpPr>
+          <p:cNvPr id="167" name="Straight Connector 166">
+            <a:extLst>
+              <a:ext uri="{FF2B5EF4-FFF2-40B4-BE49-F238E27FC236}">
+                <a16:creationId xmlns:a16="http://schemas.microsoft.com/office/drawing/2014/main" id="{2CAC6CD9-2066-4A47-836B-66071FE7669A}"/>
+              </a:ext>
+            </a:extLst>
+          </p:cNvPr>
+          <p:cNvCxnSpPr>
+            <a:cxnSpLocks/>
+            <a:endCxn id="166" idx="0"/>
+          </p:cNvCxnSpPr>
+          <p:nvPr/>
+        </p:nvCxnSpPr>
+        <p:spPr>
+          <a:xfrm flipH="1">
+            <a:off x="1074793" y="5100781"/>
+            <a:ext cx="872030" cy="853890"/>
+          </a:xfrm>
+          <a:prstGeom prst="line">
+            <a:avLst/>
+          </a:prstGeom>
+        </p:spPr>
+        <p:style>
+          <a:lnRef idx="1">
+            <a:schemeClr val="accent3"/>
+          </a:lnRef>
+          <a:fillRef idx="0">
+            <a:schemeClr val="accent3"/>
+          </a:fillRef>
+          <a:effectRef idx="0">
+            <a:schemeClr val="accent3"/>
+          </a:effectRef>
+          <a:fontRef idx="minor">
+            <a:schemeClr val="tx1"/>
+          </a:fontRef>
+        </p:style>
+      </p:cxnSp>
+      <p:cxnSp>
+        <p:nvCxnSpPr>
+          <p:cNvPr id="199" name="Straight Arrow Connector 198">
+            <a:extLst>
+              <a:ext uri="{FF2B5EF4-FFF2-40B4-BE49-F238E27FC236}">
+                <a16:creationId xmlns:a16="http://schemas.microsoft.com/office/drawing/2014/main" id="{E1533896-C3E9-4012-8ADC-066755B9EE4A}"/>
+              </a:ext>
+            </a:extLst>
+          </p:cNvPr>
+          <p:cNvCxnSpPr>
+            <a:cxnSpLocks/>
+          </p:cNvCxnSpPr>
+          <p:nvPr/>
+        </p:nvCxnSpPr>
+        <p:spPr>
+          <a:xfrm flipV="1">
+            <a:off x="7253838" y="1736759"/>
+            <a:ext cx="734272" cy="9189"/>
+          </a:xfrm>
+          <a:prstGeom prst="straightConnector1">
+            <a:avLst/>
+          </a:prstGeom>
+          <a:ln w="19050">
+            <a:prstDash val="sysDash"/>
+            <a:tailEnd type="triangle"/>
+          </a:ln>
+        </p:spPr>
+        <p:style>
+          <a:lnRef idx="1">
+            <a:schemeClr val="accent1"/>
+          </a:lnRef>
+          <a:fillRef idx="0">
+            <a:schemeClr val="accent1"/>
+          </a:fillRef>
+          <a:effectRef idx="0">
+            <a:schemeClr val="accent1"/>
+          </a:effectRef>
+          <a:fontRef idx="minor">
+            <a:schemeClr val="tx1"/>
+          </a:fontRef>
+        </p:style>
+      </p:cxnSp>
+      <p:sp>
+        <p:nvSpPr>
+          <p:cNvPr id="200" name="TextBox 199">
+            <a:extLst>
+              <a:ext uri="{FF2B5EF4-FFF2-40B4-BE49-F238E27FC236}">
+                <a16:creationId xmlns:a16="http://schemas.microsoft.com/office/drawing/2014/main" id="{54AF330B-84EC-4C3F-89EA-30668B6923C3}"/>
+              </a:ext>
+            </a:extLst>
+          </p:cNvPr>
+          <p:cNvSpPr txBox="1"/>
+          <p:nvPr/>
+        </p:nvSpPr>
+        <p:spPr>
+          <a:xfrm>
+            <a:off x="8000422" y="1526077"/>
+            <a:ext cx="4003532" cy="369332"/>
+          </a:xfrm>
+          <a:prstGeom prst="rect">
+            <a:avLst/>
+          </a:prstGeom>
+          <a:noFill/>
+        </p:spPr>
+        <p:txBody>
+          <a:bodyPr wrap="none" rtlCol="0">
+            <a:spAutoFit/>
+          </a:bodyPr>
+          <a:lstStyle/>
+          <a:p>
+            <a:r>
+              <a:rPr lang="en-US" dirty="0"/>
+              <a:t>implicit within-object target dependency</a:t>
             </a:r>
           </a:p>
         </p:txBody>

</xml_diff>